<commit_message>
feat: enhance PPT generation with debugging support and new slide layout for level 3 headings
</commit_message>
<xml_diff>
--- a/assets/templates/template.pptx
+++ b/assets/templates/template.pptx
@@ -6048,24 +6048,6 @@
             <a:spLocks noGrp="1"/>
           </p:cNvSpPr>
           <p:nvPr>
-            <p:ph type="body" sz="quarter" idx="13"/>
-          </p:nvPr>
-        </p:nvSpPr>
-        <p:spPr/>
-        <p:txBody>
-          <a:bodyPr/>
-          <a:p>
-            <a:endParaRPr lang="zh-CN" altLang="en-US"/>
-          </a:p>
-        </p:txBody>
-      </p:sp>
-      <p:sp>
-        <p:nvSpPr>
-          <p:cNvPr id="4" name="文本占位符 3"/>
-          <p:cNvSpPr>
-            <a:spLocks noGrp="1"/>
-          </p:cNvSpPr>
-          <p:nvPr>
             <p:ph type="body" idx="1"/>
           </p:nvPr>
         </p:nvSpPr>

</xml_diff>